<commit_message>
Creation of Test pkd99 Schema and Database
</commit_message>
<xml_diff>
--- a/OutputFiles/CubeQuery0.pptx
+++ b/OutputFiles/CubeQuery0.pptx
@@ -4542,7 +4542,7 @@
       </p:pic>
       <p:pic>
         <p:nvPicPr>
-          <p:cNvPr id="4" name="8N25H.wav">
+          <p:cNvPr id="4" name="JQP52JOL.wav">
             <a:hlinkClick r:id="" action="ppaction://media"/>
           </p:cNvPr>
           <p:cNvPicPr>
@@ -5855,7 +5855,7 @@
       </p:graphicFrame>
       <p:pic>
         <p:nvPicPr>
-          <p:cNvPr id="4" name="OHNHJKWPH.wav">
+          <p:cNvPr id="4" name="85EPY.wav">
             <a:hlinkClick r:id="" action="ppaction://media"/>
           </p:cNvPr>
           <p:cNvPicPr>
@@ -6166,7 +6166,7 @@
       </p:sp>
       <p:pic>
         <p:nvPicPr>
-          <p:cNvPr id="4" name="S466DXU0.wav">
+          <p:cNvPr id="4" name="SAM6CWT3.wav">
             <a:hlinkClick r:id="" action="ppaction://media"/>
           </p:cNvPr>
           <p:cNvPicPr>
@@ -7011,7 +7011,7 @@
       </p:graphicFrame>
       <p:pic>
         <p:nvPicPr>
-          <p:cNvPr id="4" name="4Y4WC8.wav">
+          <p:cNvPr id="4" name="18W67R208.wav">
             <a:hlinkClick r:id="" action="ppaction://media"/>
           </p:cNvPr>
           <p:cNvPicPr>
@@ -7886,7 +7886,7 @@
       </p:graphicFrame>
       <p:pic>
         <p:nvPicPr>
-          <p:cNvPr id="4" name="4I4I9OLKS.wav">
+          <p:cNvPr id="4" name="NDETIG.wav">
             <a:hlinkClick r:id="" action="ppaction://media"/>
           </p:cNvPr>
           <p:cNvPicPr>
@@ -8197,7 +8197,7 @@
       </p:sp>
       <p:pic>
         <p:nvPicPr>
-          <p:cNvPr id="4" name="CQM4MNJ4.wav">
+          <p:cNvPr id="4" name="UI21Y89RX.wav">
             <a:hlinkClick r:id="" action="ppaction://media"/>
           </p:cNvPr>
           <p:cNvPicPr>
@@ -11166,7 +11166,7 @@
       </p:graphicFrame>
       <p:pic>
         <p:nvPicPr>
-          <p:cNvPr id="4" name="FX2TBE843.wav">
+          <p:cNvPr id="4" name="HY32O9LWD.wav">
             <a:hlinkClick r:id="" action="ppaction://media"/>
           </p:cNvPr>
           <p:cNvPicPr>
@@ -11544,7 +11544,7 @@
       </p:sp>
       <p:pic>
         <p:nvPicPr>
-          <p:cNvPr id="4" name="R55EYH0.wav">
+          <p:cNvPr id="4" name="S4MF5.wav">
             <a:hlinkClick r:id="" action="ppaction://media"/>
           </p:cNvPr>
           <p:cNvPicPr>

</xml_diff>